<commit_message>
pt 1 2 3 4
</commit_message>
<xml_diff>
--- a/project-4-main/doc/proj4_report.pptx
+++ b/project-4-main/doc/proj4_report.pptx
@@ -36021,16 +36021,16 @@
               </a:tabLst>
             </a:pPr>
             <a:r>
-              <a:rPr lang="en" sz="2800" b="0" strike="noStrike" spc="-1">
+              <a:rPr lang="en-US" sz="2800" b="0" strike="noStrike" spc="-1" dirty="0">
                 <a:solidFill>
                   <a:srgbClr val="595959"/>
                 </a:solidFill>
                 <a:latin typeface="Arial"/>
                 <a:ea typeface="Arial"/>
               </a:rPr>
-              <a:t>[name]</a:t>
-            </a:r>
-            <a:endParaRPr lang="en-US" sz="2800" b="0" strike="noStrike" spc="-1">
+              <a:t>Anirudh Arunkumar</a:t>
+            </a:r>
+            <a:endParaRPr lang="en-US" sz="2800" b="0" strike="noStrike" spc="-1" dirty="0">
               <a:solidFill>
                 <a:srgbClr val="000000"/>
               </a:solidFill>
@@ -36051,16 +36051,15 @@
               </a:tabLst>
             </a:pPr>
             <a:r>
-              <a:rPr lang="en" sz="2800" b="0" strike="noStrike" spc="-1">
+              <a:rPr lang="en" sz="2800" spc="-1" dirty="0">
                 <a:solidFill>
                   <a:srgbClr val="595959"/>
                 </a:solidFill>
                 <a:latin typeface="Arial"/>
-                <a:ea typeface="Arial"/>
-              </a:rPr>
-              <a:t>[GT email]</a:t>
-            </a:r>
-            <a:endParaRPr lang="en-US" sz="2800" b="0" strike="noStrike" spc="-1">
+              </a:rPr>
+              <a:t>aarunkumar8@gatech.edu</a:t>
+            </a:r>
+            <a:endParaRPr lang="en-US" sz="2800" b="0" strike="noStrike" spc="-1" dirty="0">
               <a:solidFill>
                 <a:srgbClr val="000000"/>
               </a:solidFill>
@@ -36081,16 +36080,15 @@
               </a:tabLst>
             </a:pPr>
             <a:r>
-              <a:rPr lang="en" sz="2800" b="0" strike="noStrike" spc="-1">
+              <a:rPr lang="en" sz="2800" spc="-1" dirty="0">
                 <a:solidFill>
                   <a:srgbClr val="595959"/>
                 </a:solidFill>
                 <a:latin typeface="Arial"/>
-                <a:ea typeface="Arial"/>
-              </a:rPr>
-              <a:t>[GT username]</a:t>
-            </a:r>
-            <a:endParaRPr lang="en-US" sz="2800" b="0" strike="noStrike" spc="-1">
+              </a:rPr>
+              <a:t>aarunkumar8</a:t>
+            </a:r>
+            <a:endParaRPr lang="en-US" sz="2800" b="0" strike="noStrike" spc="-1" dirty="0">
               <a:solidFill>
                 <a:srgbClr val="000000"/>
               </a:solidFill>
@@ -36111,16 +36109,15 @@
               </a:tabLst>
             </a:pPr>
             <a:r>
-              <a:rPr lang="en" sz="2800" b="0" strike="noStrike" spc="-1">
+              <a:rPr lang="en" sz="2800" spc="-1" dirty="0">
                 <a:solidFill>
                   <a:srgbClr val="595959"/>
                 </a:solidFill>
                 <a:latin typeface="Arial"/>
-                <a:ea typeface="Arial"/>
-              </a:rPr>
-              <a:t>[GT ID]</a:t>
-            </a:r>
-            <a:endParaRPr lang="en-US" sz="2800" b="0" strike="noStrike" spc="-1">
+              </a:rPr>
+              <a:t>903572206</a:t>
+            </a:r>
+            <a:endParaRPr lang="en-US" sz="2800" b="0" strike="noStrike" spc="-1" dirty="0">
               <a:solidFill>
                 <a:srgbClr val="000000"/>
               </a:solidFill>
@@ -36140,7 +36137,7 @@
                 <a:tab pos="0" algn="l"/>
               </a:tabLst>
             </a:pPr>
-            <a:endParaRPr lang="en-US" sz="2800" b="0" strike="noStrike" spc="-1">
+            <a:endParaRPr lang="en-US" sz="2800" b="0" strike="noStrike" spc="-1" dirty="0">
               <a:solidFill>
                 <a:srgbClr val="000000"/>
               </a:solidFill>

</xml_diff>